<commit_message>
Colocacao de imagem em arquivo recuperado
</commit_message>
<xml_diff>
--- a/PastaDocumento/PITCH-PROJETO.pptx
+++ b/PastaDocumento/PITCH-PROJETO.pptx
@@ -3314,35 +3314,9 @@
   <p:cSld>
     <p:bg>
       <p:bgPr>
-        <a:gradFill>
-          <a:gsLst>
-            <a:gs pos="0">
-              <a:schemeClr val="accent1">
-                <a:lumMod val="5000"/>
-                <a:lumOff val="95000"/>
-              </a:schemeClr>
-            </a:gs>
-            <a:gs pos="74000">
-              <a:schemeClr val="accent1">
-                <a:lumMod val="45000"/>
-                <a:lumOff val="55000"/>
-              </a:schemeClr>
-            </a:gs>
-            <a:gs pos="83000">
-              <a:schemeClr val="accent1">
-                <a:lumMod val="45000"/>
-                <a:lumOff val="55000"/>
-              </a:schemeClr>
-            </a:gs>
-            <a:gs pos="100000">
-              <a:schemeClr val="accent1">
-                <a:lumMod val="30000"/>
-                <a:lumOff val="70000"/>
-              </a:schemeClr>
-            </a:gs>
-          </a:gsLst>
-          <a:lin ang="5400000" scaled="1"/>
-        </a:gradFill>
+        <a:solidFill>
+          <a:schemeClr val="bg1"/>
+        </a:solidFill>
         <a:effectLst/>
       </p:bgPr>
     </p:bg>
@@ -3360,6 +3334,182 @@
           <a:chExt cx="0" cy="0"/>
         </a:xfrm>
       </p:grpSpPr>
+      <p:sp useBgFill="1">
+        <p:nvSpPr>
+          <p:cNvPr id="18" name="Rectangle 9">
+            <a:extLst>
+              <a:ext uri="{FF2B5EF4-FFF2-40B4-BE49-F238E27FC236}">
+                <a16:creationId xmlns:a16="http://schemas.microsoft.com/office/drawing/2014/main" id="{6F828D28-8E09-41CC-8229-3070B5467A96}"/>
+              </a:ext>
+              <a:ext uri="{C183D7F6-B498-43B3-948B-1728B52AA6E4}">
+                <adec:decorative xmlns:adec="http://schemas.microsoft.com/office/drawing/2017/decorative" val="1"/>
+              </a:ext>
+            </a:extLst>
+          </p:cNvPr>
+          <p:cNvSpPr>
+            <a:spLocks noGrp="1" noRot="1" noChangeAspect="1" noMove="1" noResize="1" noEditPoints="1" noAdjustHandles="1" noChangeArrowheads="1" noChangeShapeType="1" noTextEdit="1"/>
+          </p:cNvSpPr>
+          <p:nvPr>
+            <p:extLst>
+              <p:ext uri="{386F3935-93C4-4BCD-93E2-E3B085C9AB24}">
+                <p16:designElem xmlns:p16="http://schemas.microsoft.com/office/powerpoint/2015/main" val="1"/>
+              </p:ext>
+            </p:extLst>
+          </p:nvPr>
+        </p:nvSpPr>
+        <p:spPr>
+          <a:xfrm>
+            <a:off x="-1" y="0"/>
+            <a:ext cx="12188952" cy="6858000"/>
+          </a:xfrm>
+          <a:prstGeom prst="rect">
+            <a:avLst/>
+          </a:prstGeom>
+          <a:ln>
+            <a:noFill/>
+          </a:ln>
+        </p:spPr>
+        <p:style>
+          <a:lnRef idx="2">
+            <a:schemeClr val="accent1">
+              <a:shade val="50000"/>
+            </a:schemeClr>
+          </a:lnRef>
+          <a:fillRef idx="1">
+            <a:schemeClr val="accent1"/>
+          </a:fillRef>
+          <a:effectRef idx="0">
+            <a:schemeClr val="accent1"/>
+          </a:effectRef>
+          <a:fontRef idx="minor">
+            <a:schemeClr val="lt1"/>
+          </a:fontRef>
+        </p:style>
+        <p:txBody>
+          <a:bodyPr rtlCol="0" anchor="ctr"/>
+          <a:lstStyle/>
+          <a:p>
+            <a:pPr algn="ctr"/>
+            <a:endParaRPr lang="en-US"/>
+          </a:p>
+        </p:txBody>
+      </p:sp>
+      <p:pic>
+        <p:nvPicPr>
+          <p:cNvPr id="5" name="Imagem 4" descr="Imagem digital fictícia de personagem de desenho animado&#10;&#10;Descrição gerada automaticamente com confiança baixa">
+            <a:extLst>
+              <a:ext uri="{FF2B5EF4-FFF2-40B4-BE49-F238E27FC236}">
+                <a16:creationId xmlns:a16="http://schemas.microsoft.com/office/drawing/2014/main" id="{C291FB67-2C82-3A0E-E194-6D064E70B015}"/>
+              </a:ext>
+            </a:extLst>
+          </p:cNvPr>
+          <p:cNvPicPr>
+            <a:picLocks noChangeAspect="1"/>
+          </p:cNvPicPr>
+          <p:nvPr/>
+        </p:nvPicPr>
+        <p:blipFill rotWithShape="1">
+          <a:blip r:embed="rId2">
+            <a:extLst>
+              <a:ext uri="{28A0092B-C50C-407E-A947-70E740481C1C}">
+                <a14:useLocalDpi xmlns:a14="http://schemas.microsoft.com/office/drawing/2010/main" val="0"/>
+              </a:ext>
+            </a:extLst>
+          </a:blip>
+          <a:srcRect l="1"/>
+          <a:stretch/>
+        </p:blipFill>
+        <p:spPr>
+          <a:xfrm>
+            <a:off x="0" y="0"/>
+            <a:ext cx="12192000" cy="6858000"/>
+          </a:xfrm>
+          <a:prstGeom prst="rect">
+            <a:avLst/>
+          </a:prstGeom>
+        </p:spPr>
+      </p:pic>
+      <p:sp>
+        <p:nvSpPr>
+          <p:cNvPr id="19" name="Rectangle 11">
+            <a:extLst>
+              <a:ext uri="{FF2B5EF4-FFF2-40B4-BE49-F238E27FC236}">
+                <a16:creationId xmlns:a16="http://schemas.microsoft.com/office/drawing/2014/main" id="{D5B012D8-7F27-4758-9AC6-C889B154BD73}"/>
+              </a:ext>
+              <a:ext uri="{C183D7F6-B498-43B3-948B-1728B52AA6E4}">
+                <adec:decorative xmlns:adec="http://schemas.microsoft.com/office/drawing/2017/decorative" val="1"/>
+              </a:ext>
+            </a:extLst>
+          </p:cNvPr>
+          <p:cNvSpPr>
+            <a:spLocks noGrp="1" noRot="1" noChangeAspect="1" noMove="1" noResize="1" noEditPoints="1" noAdjustHandles="1" noChangeArrowheads="1" noChangeShapeType="1" noTextEdit="1"/>
+          </p:cNvSpPr>
+          <p:nvPr>
+            <p:extLst>
+              <p:ext uri="{386F3935-93C4-4BCD-93E2-E3B085C9AB24}">
+                <p16:designElem xmlns:p16="http://schemas.microsoft.com/office/powerpoint/2015/main" val="1"/>
+              </p:ext>
+            </p:extLst>
+          </p:nvPr>
+        </p:nvSpPr>
+        <p:spPr>
+          <a:xfrm rot="16200000">
+            <a:off x="-1103377" y="1100316"/>
+            <a:ext cx="6858003" cy="4657347"/>
+          </a:xfrm>
+          <a:prstGeom prst="rect">
+            <a:avLst/>
+          </a:prstGeom>
+          <a:gradFill flip="none" rotWithShape="1">
+            <a:gsLst>
+              <a:gs pos="48000">
+                <a:srgbClr val="000000">
+                  <a:alpha val="24000"/>
+                </a:srgbClr>
+              </a:gs>
+              <a:gs pos="85000">
+                <a:srgbClr val="000000">
+                  <a:alpha val="45000"/>
+                </a:srgbClr>
+              </a:gs>
+              <a:gs pos="0">
+                <a:srgbClr val="000000">
+                  <a:alpha val="0"/>
+                </a:srgbClr>
+              </a:gs>
+            </a:gsLst>
+            <a:lin ang="16200000" scaled="1"/>
+            <a:tileRect/>
+          </a:gradFill>
+          <a:ln>
+            <a:noFill/>
+          </a:ln>
+        </p:spPr>
+        <p:style>
+          <a:lnRef idx="2">
+            <a:schemeClr val="accent1">
+              <a:shade val="50000"/>
+            </a:schemeClr>
+          </a:lnRef>
+          <a:fillRef idx="1">
+            <a:schemeClr val="accent1"/>
+          </a:fillRef>
+          <a:effectRef idx="0">
+            <a:schemeClr val="accent1"/>
+          </a:effectRef>
+          <a:fontRef idx="minor">
+            <a:schemeClr val="lt1"/>
+          </a:fontRef>
+        </p:style>
+        <p:txBody>
+          <a:bodyPr rtlCol="0" anchor="ctr"/>
+          <a:lstStyle/>
+          <a:p>
+            <a:pPr algn="ctr"/>
+            <a:endParaRPr lang="en-US"/>
+          </a:p>
+        </p:txBody>
+      </p:sp>
       <p:sp>
         <p:nvSpPr>
           <p:cNvPr id="2" name="Título 1">
@@ -3376,16 +3526,32 @@
             <p:ph type="ctrTitle"/>
           </p:nvPr>
         </p:nvSpPr>
-        <p:spPr/>
-        <p:txBody>
-          <a:bodyPr/>
-          <a:lstStyle/>
-          <a:p>
-            <a:r>
-              <a:rPr lang="en-US" dirty="0"/>
+        <p:spPr>
+          <a:xfrm>
+            <a:off x="643466" y="643467"/>
+            <a:ext cx="5452529" cy="3569242"/>
+          </a:xfrm>
+        </p:spPr>
+        <p:txBody>
+          <a:bodyPr anchor="t">
+            <a:normAutofit/>
+          </a:bodyPr>
+          <a:lstStyle/>
+          <a:p>
+            <a:pPr algn="l"/>
+            <a:r>
+              <a:rPr lang="en-US" sz="5200">
+                <a:solidFill>
+                  <a:srgbClr val="FFFFFF"/>
+                </a:solidFill>
+              </a:rPr>
               <a:t>PITCH</a:t>
             </a:r>
-            <a:endParaRPr lang="pt-BR" dirty="0"/>
+            <a:endParaRPr lang="pt-BR" sz="5200">
+              <a:solidFill>
+                <a:srgbClr val="FFFFFF"/>
+              </a:solidFill>
+            </a:endParaRPr>
           </a:p>
         </p:txBody>
       </p:sp>
@@ -3405,28 +3571,113 @@
             <p:ph type="subTitle" idx="1"/>
           </p:nvPr>
         </p:nvSpPr>
-        <p:spPr/>
-        <p:txBody>
-          <a:bodyPr/>
-          <a:lstStyle/>
-          <a:p>
-            <a:r>
-              <a:rPr lang="en-US" dirty="0" err="1"/>
-              <a:t>Projeto</a:t>
-            </a:r>
-            <a:r>
-              <a:rPr lang="en-US" dirty="0"/>
-              <a:t> </a:t>
-            </a:r>
-            <a:r>
-              <a:rPr lang="en-US" dirty="0" err="1"/>
-              <a:t>Exemplo</a:t>
-            </a:r>
-            <a:r>
-              <a:rPr lang="en-US"/>
-              <a:t> GIT – 2SIPF</a:t>
-            </a:r>
-            <a:endParaRPr lang="pt-BR"/>
+        <p:spPr>
+          <a:xfrm>
+            <a:off x="643466" y="4551037"/>
+            <a:ext cx="5449479" cy="1578054"/>
+          </a:xfrm>
+        </p:spPr>
+        <p:txBody>
+          <a:bodyPr anchor="b">
+            <a:normAutofit/>
+          </a:bodyPr>
+          <a:lstStyle/>
+          <a:p>
+            <a:pPr algn="l"/>
+            <a:r>
+              <a:rPr lang="en-US">
+                <a:solidFill>
+                  <a:srgbClr val="FFFFFF"/>
+                </a:solidFill>
+              </a:rPr>
+              <a:t>Projeto Exemplo GIT – 2SIPF</a:t>
+            </a:r>
+            <a:endParaRPr lang="pt-BR">
+              <a:solidFill>
+                <a:srgbClr val="FFFFFF"/>
+              </a:solidFill>
+            </a:endParaRPr>
+          </a:p>
+        </p:txBody>
+      </p:sp>
+      <p:sp>
+        <p:nvSpPr>
+          <p:cNvPr id="20" name="Rectangle 13">
+            <a:extLst>
+              <a:ext uri="{FF2B5EF4-FFF2-40B4-BE49-F238E27FC236}">
+                <a16:creationId xmlns:a16="http://schemas.microsoft.com/office/drawing/2014/main" id="{4063B759-00FC-46D1-9898-8E8625268FAF}"/>
+              </a:ext>
+              <a:ext uri="{C183D7F6-B498-43B3-948B-1728B52AA6E4}">
+                <adec:decorative xmlns:adec="http://schemas.microsoft.com/office/drawing/2017/decorative" val="1"/>
+              </a:ext>
+            </a:extLst>
+          </p:cNvPr>
+          <p:cNvSpPr>
+            <a:spLocks noGrp="1" noRot="1" noChangeAspect="1" noMove="1" noResize="1" noEditPoints="1" noAdjustHandles="1" noChangeArrowheads="1" noChangeShapeType="1" noTextEdit="1"/>
+          </p:cNvSpPr>
+          <p:nvPr>
+            <p:extLst>
+              <p:ext uri="{386F3935-93C4-4BCD-93E2-E3B085C9AB24}">
+                <p16:designElem xmlns:p16="http://schemas.microsoft.com/office/powerpoint/2015/main" val="1"/>
+              </p:ext>
+            </p:extLst>
+          </p:nvPr>
+        </p:nvSpPr>
+        <p:spPr>
+          <a:xfrm rot="5400000">
+            <a:off x="7540187" y="2206184"/>
+            <a:ext cx="6858003" cy="2445624"/>
+          </a:xfrm>
+          <a:prstGeom prst="rect">
+            <a:avLst/>
+          </a:prstGeom>
+          <a:gradFill flip="none" rotWithShape="1">
+            <a:gsLst>
+              <a:gs pos="48000">
+                <a:srgbClr val="000000">
+                  <a:alpha val="24000"/>
+                </a:srgbClr>
+              </a:gs>
+              <a:gs pos="85000">
+                <a:srgbClr val="000000">
+                  <a:alpha val="45000"/>
+                </a:srgbClr>
+              </a:gs>
+              <a:gs pos="0">
+                <a:srgbClr val="000000">
+                  <a:alpha val="0"/>
+                </a:srgbClr>
+              </a:gs>
+            </a:gsLst>
+            <a:lin ang="16200000" scaled="1"/>
+            <a:tileRect/>
+          </a:gradFill>
+          <a:ln>
+            <a:noFill/>
+          </a:ln>
+        </p:spPr>
+        <p:style>
+          <a:lnRef idx="2">
+            <a:schemeClr val="accent1">
+              <a:shade val="50000"/>
+            </a:schemeClr>
+          </a:lnRef>
+          <a:fillRef idx="1">
+            <a:schemeClr val="accent1"/>
+          </a:fillRef>
+          <a:effectRef idx="0">
+            <a:schemeClr val="accent1"/>
+          </a:effectRef>
+          <a:fontRef idx="minor">
+            <a:schemeClr val="lt1"/>
+          </a:fontRef>
+        </p:style>
+        <p:txBody>
+          <a:bodyPr rtlCol="0" anchor="ctr"/>
+          <a:lstStyle/>
+          <a:p>
+            <a:pPr algn="ctr"/>
+            <a:endParaRPr lang="en-US"/>
           </a:p>
         </p:txBody>
       </p:sp>

</xml_diff>